<commit_message>
Parasitic simulation model is validated.
For higher frequency, we observe that difference between simulation and parasitic model. It can be caused from ignored resistance at parasitic model
</commit_message>
<xml_diff>
--- a/Reports/IMMD/Switching Fuction.pptx
+++ b/Reports/IMMD/Switching Fuction.pptx
@@ -268,7 +268,7 @@
           <a:p>
             <a:fld id="{EF03B490-B0C4-4A44-B4B5-AF20CBE90840}" type="datetimeFigureOut">
               <a:rPr lang="en-US" smtClean="0"/>
-              <a:t>5/26/2020</a:t>
+              <a:t>6/13/2020</a:t>
             </a:fld>
             <a:endParaRPr lang="en-US"/>
           </a:p>
@@ -466,7 +466,7 @@
           <a:p>
             <a:fld id="{EF03B490-B0C4-4A44-B4B5-AF20CBE90840}" type="datetimeFigureOut">
               <a:rPr lang="en-US" smtClean="0"/>
-              <a:t>5/26/2020</a:t>
+              <a:t>6/13/2020</a:t>
             </a:fld>
             <a:endParaRPr lang="en-US"/>
           </a:p>
@@ -674,7 +674,7 @@
           <a:p>
             <a:fld id="{EF03B490-B0C4-4A44-B4B5-AF20CBE90840}" type="datetimeFigureOut">
               <a:rPr lang="en-US" smtClean="0"/>
-              <a:t>5/26/2020</a:t>
+              <a:t>6/13/2020</a:t>
             </a:fld>
             <a:endParaRPr lang="en-US"/>
           </a:p>
@@ -872,7 +872,7 @@
           <a:p>
             <a:fld id="{EF03B490-B0C4-4A44-B4B5-AF20CBE90840}" type="datetimeFigureOut">
               <a:rPr lang="en-US" smtClean="0"/>
-              <a:t>5/26/2020</a:t>
+              <a:t>6/13/2020</a:t>
             </a:fld>
             <a:endParaRPr lang="en-US"/>
           </a:p>
@@ -1147,7 +1147,7 @@
           <a:p>
             <a:fld id="{EF03B490-B0C4-4A44-B4B5-AF20CBE90840}" type="datetimeFigureOut">
               <a:rPr lang="en-US" smtClean="0"/>
-              <a:t>5/26/2020</a:t>
+              <a:t>6/13/2020</a:t>
             </a:fld>
             <a:endParaRPr lang="en-US"/>
           </a:p>
@@ -1412,7 +1412,7 @@
           <a:p>
             <a:fld id="{EF03B490-B0C4-4A44-B4B5-AF20CBE90840}" type="datetimeFigureOut">
               <a:rPr lang="en-US" smtClean="0"/>
-              <a:t>5/26/2020</a:t>
+              <a:t>6/13/2020</a:t>
             </a:fld>
             <a:endParaRPr lang="en-US"/>
           </a:p>
@@ -1824,7 +1824,7 @@
           <a:p>
             <a:fld id="{EF03B490-B0C4-4A44-B4B5-AF20CBE90840}" type="datetimeFigureOut">
               <a:rPr lang="en-US" smtClean="0"/>
-              <a:t>5/26/2020</a:t>
+              <a:t>6/13/2020</a:t>
             </a:fld>
             <a:endParaRPr lang="en-US"/>
           </a:p>
@@ -1965,7 +1965,7 @@
           <a:p>
             <a:fld id="{EF03B490-B0C4-4A44-B4B5-AF20CBE90840}" type="datetimeFigureOut">
               <a:rPr lang="en-US" smtClean="0"/>
-              <a:t>5/26/2020</a:t>
+              <a:t>6/13/2020</a:t>
             </a:fld>
             <a:endParaRPr lang="en-US"/>
           </a:p>
@@ -2078,7 +2078,7 @@
           <a:p>
             <a:fld id="{EF03B490-B0C4-4A44-B4B5-AF20CBE90840}" type="datetimeFigureOut">
               <a:rPr lang="en-US" smtClean="0"/>
-              <a:t>5/26/2020</a:t>
+              <a:t>6/13/2020</a:t>
             </a:fld>
             <a:endParaRPr lang="en-US"/>
           </a:p>
@@ -2389,7 +2389,7 @@
           <a:p>
             <a:fld id="{EF03B490-B0C4-4A44-B4B5-AF20CBE90840}" type="datetimeFigureOut">
               <a:rPr lang="en-US" smtClean="0"/>
-              <a:t>5/26/2020</a:t>
+              <a:t>6/13/2020</a:t>
             </a:fld>
             <a:endParaRPr lang="en-US"/>
           </a:p>
@@ -2677,7 +2677,7 @@
           <a:p>
             <a:fld id="{EF03B490-B0C4-4A44-B4B5-AF20CBE90840}" type="datetimeFigureOut">
               <a:rPr lang="en-US" smtClean="0"/>
-              <a:t>5/26/2020</a:t>
+              <a:t>6/13/2020</a:t>
             </a:fld>
             <a:endParaRPr lang="en-US"/>
           </a:p>
@@ -2918,7 +2918,7 @@
           <a:p>
             <a:fld id="{EF03B490-B0C4-4A44-B4B5-AF20CBE90840}" type="datetimeFigureOut">
               <a:rPr lang="en-US" smtClean="0"/>
-              <a:t>5/26/2020</a:t>
+              <a:t>6/13/2020</a:t>
             </a:fld>
             <a:endParaRPr lang="en-US"/>
           </a:p>
@@ -3445,8 +3445,8 @@
           <a:chExt cx="0" cy="0"/>
         </a:xfrm>
       </p:grpSpPr>
-      <mc:AlternateContent xmlns:mc="http://schemas.openxmlformats.org/markup-compatibility/2006">
-        <mc:Choice xmlns:a14="http://schemas.microsoft.com/office/drawing/2010/main" Requires="a14">
+      <mc:AlternateContent xmlns:mc="http://schemas.openxmlformats.org/markup-compatibility/2006" xmlns:a14="http://schemas.microsoft.com/office/drawing/2010/main">
+        <mc:Choice Requires="a14">
           <p:sp>
             <p:nvSpPr>
               <p:cNvPr id="4" name="Rectangle 3">
@@ -3474,6 +3474,7 @@
               </a:bodyPr>
               <a:lstStyle/>
               <a:p>
+                <a:pPr/>
                 <a14:m>
                   <m:oMathPara xmlns:m="http://schemas.openxmlformats.org/officeDocument/2006/math">
                     <m:oMathParaPr>
@@ -3613,6 +3614,7 @@
                 </a:endParaRPr>
               </a:p>
               <a:p>
+                <a:pPr/>
                 <a14:m>
                   <m:oMathPara xmlns:m="http://schemas.openxmlformats.org/officeDocument/2006/math">
                     <m:oMathParaPr>
@@ -3702,13 +3704,7 @@
                         <a:rPr lang="tr-TR">
                           <a:latin typeface="Cambria Math" panose="02040503050406030204" pitchFamily="18" charset="0"/>
                         </a:rPr>
-                        <m:t>)</m:t>
-                      </m:r>
-                      <m:r>
-                        <a:rPr lang="tr-TR">
-                          <a:latin typeface="Cambria Math" panose="02040503050406030204" pitchFamily="18" charset="0"/>
-                        </a:rPr>
-                        <m:t>=</m:t>
+                        <m:t>)=</m:t>
                       </m:r>
                       <m:r>
                         <m:rPr>
@@ -3764,7 +3760,7 @@
                     <m:sSup>
                       <m:sSupPr>
                         <m:ctrlPr>
-                          <a:rPr lang="tr-TR" b="0" i="0" smtClean="0">
+                          <a:rPr lang="tr-TR" b="0" i="1" smtClean="0">
                             <a:latin typeface="Cambria Math" panose="02040503050406030204" pitchFamily="18" charset="0"/>
                           </a:rPr>
                         </m:ctrlPr>
@@ -3986,13 +3982,7 @@
                       <a:rPr lang="tr-TR" i="1">
                         <a:latin typeface="Cambria Math" panose="02040503050406030204" pitchFamily="18" charset="0"/>
                       </a:rPr>
-                      <m:t>𝐴𝐶𝑐</m:t>
-                    </m:r>
-                    <m:r>
-                      <a:rPr lang="tr-TR" i="1">
-                        <a:latin typeface="Cambria Math" panose="02040503050406030204" pitchFamily="18" charset="0"/>
-                      </a:rPr>
-                      <m:t>𝑜𝑠</m:t>
+                      <m:t>𝐴𝐶𝑐𝑜𝑠</m:t>
                     </m:r>
                     <m:d>
                       <m:dPr>
@@ -4028,7 +4018,6 @@
                 <a:endParaRPr lang="tr-TR" dirty="0"/>
               </a:p>
               <a:p>
-                <a:pPr/>
                 <a:endParaRPr lang="tr-TR" dirty="0"/>
               </a:p>
               <a:p>
@@ -4040,7 +4029,7 @@
             </p:txBody>
           </p:sp>
         </mc:Choice>
-        <mc:Fallback>
+        <mc:Fallback xmlns="">
           <p:sp>
             <p:nvSpPr>
               <p:cNvPr id="4" name="Rectangle 3">
@@ -6432,8 +6421,8 @@
           </p:sp>
         </mc:Fallback>
       </mc:AlternateContent>
-      <mc:AlternateContent xmlns:mc="http://schemas.openxmlformats.org/markup-compatibility/2006">
-        <mc:Choice xmlns:a14="http://schemas.microsoft.com/office/drawing/2010/main" Requires="a14">
+      <mc:AlternateContent xmlns:mc="http://schemas.openxmlformats.org/markup-compatibility/2006" xmlns:a14="http://schemas.microsoft.com/office/drawing/2010/main">
+        <mc:Choice Requires="a14">
           <p:sp>
             <p:nvSpPr>
               <p:cNvPr id="6" name="TextBox 5">
@@ -6980,7 +6969,7 @@
             </p:txBody>
           </p:sp>
         </mc:Choice>
-        <mc:Fallback>
+        <mc:Fallback xmlns="">
           <p:sp>
             <p:nvSpPr>
               <p:cNvPr id="6" name="TextBox 5">
@@ -7575,8 +7564,8 @@
           </a:p>
         </p:txBody>
       </p:sp>
-      <mc:AlternateContent xmlns:mc="http://schemas.openxmlformats.org/markup-compatibility/2006">
-        <mc:Choice xmlns:a14="http://schemas.microsoft.com/office/drawing/2010/main" Requires="a14">
+      <mc:AlternateContent xmlns:mc="http://schemas.openxmlformats.org/markup-compatibility/2006" xmlns:a14="http://schemas.microsoft.com/office/drawing/2010/main">
+        <mc:Choice Requires="a14">
           <p:sp>
             <p:nvSpPr>
               <p:cNvPr id="3" name="Content Placeholder 2">
@@ -7870,7 +7859,7 @@
             </p:txBody>
           </p:sp>
         </mc:Choice>
-        <mc:Fallback>
+        <mc:Fallback xmlns="">
           <p:sp>
             <p:nvSpPr>
               <p:cNvPr id="3" name="Content Placeholder 2">

</xml_diff>

<commit_message>
Leg current analytical model is validated and reported
only difference is DC part, I will fix it later.
</commit_message>
<xml_diff>
--- a/Reports/IMMD/Switching Fuction.pptx
+++ b/Reports/IMMD/Switching Fuction.pptx
@@ -268,7 +268,7 @@
           <a:p>
             <a:fld id="{EF03B490-B0C4-4A44-B4B5-AF20CBE90840}" type="datetimeFigureOut">
               <a:rPr lang="en-US" smtClean="0"/>
-              <a:t>6/13/2020</a:t>
+              <a:t>6/24/2020</a:t>
             </a:fld>
             <a:endParaRPr lang="en-US"/>
           </a:p>
@@ -466,7 +466,7 @@
           <a:p>
             <a:fld id="{EF03B490-B0C4-4A44-B4B5-AF20CBE90840}" type="datetimeFigureOut">
               <a:rPr lang="en-US" smtClean="0"/>
-              <a:t>6/13/2020</a:t>
+              <a:t>6/24/2020</a:t>
             </a:fld>
             <a:endParaRPr lang="en-US"/>
           </a:p>
@@ -674,7 +674,7 @@
           <a:p>
             <a:fld id="{EF03B490-B0C4-4A44-B4B5-AF20CBE90840}" type="datetimeFigureOut">
               <a:rPr lang="en-US" smtClean="0"/>
-              <a:t>6/13/2020</a:t>
+              <a:t>6/24/2020</a:t>
             </a:fld>
             <a:endParaRPr lang="en-US"/>
           </a:p>
@@ -872,7 +872,7 @@
           <a:p>
             <a:fld id="{EF03B490-B0C4-4A44-B4B5-AF20CBE90840}" type="datetimeFigureOut">
               <a:rPr lang="en-US" smtClean="0"/>
-              <a:t>6/13/2020</a:t>
+              <a:t>6/24/2020</a:t>
             </a:fld>
             <a:endParaRPr lang="en-US"/>
           </a:p>
@@ -1147,7 +1147,7 @@
           <a:p>
             <a:fld id="{EF03B490-B0C4-4A44-B4B5-AF20CBE90840}" type="datetimeFigureOut">
               <a:rPr lang="en-US" smtClean="0"/>
-              <a:t>6/13/2020</a:t>
+              <a:t>6/24/2020</a:t>
             </a:fld>
             <a:endParaRPr lang="en-US"/>
           </a:p>
@@ -1412,7 +1412,7 @@
           <a:p>
             <a:fld id="{EF03B490-B0C4-4A44-B4B5-AF20CBE90840}" type="datetimeFigureOut">
               <a:rPr lang="en-US" smtClean="0"/>
-              <a:t>6/13/2020</a:t>
+              <a:t>6/24/2020</a:t>
             </a:fld>
             <a:endParaRPr lang="en-US"/>
           </a:p>
@@ -1824,7 +1824,7 @@
           <a:p>
             <a:fld id="{EF03B490-B0C4-4A44-B4B5-AF20CBE90840}" type="datetimeFigureOut">
               <a:rPr lang="en-US" smtClean="0"/>
-              <a:t>6/13/2020</a:t>
+              <a:t>6/24/2020</a:t>
             </a:fld>
             <a:endParaRPr lang="en-US"/>
           </a:p>
@@ -1965,7 +1965,7 @@
           <a:p>
             <a:fld id="{EF03B490-B0C4-4A44-B4B5-AF20CBE90840}" type="datetimeFigureOut">
               <a:rPr lang="en-US" smtClean="0"/>
-              <a:t>6/13/2020</a:t>
+              <a:t>6/24/2020</a:t>
             </a:fld>
             <a:endParaRPr lang="en-US"/>
           </a:p>
@@ -2078,7 +2078,7 @@
           <a:p>
             <a:fld id="{EF03B490-B0C4-4A44-B4B5-AF20CBE90840}" type="datetimeFigureOut">
               <a:rPr lang="en-US" smtClean="0"/>
-              <a:t>6/13/2020</a:t>
+              <a:t>6/24/2020</a:t>
             </a:fld>
             <a:endParaRPr lang="en-US"/>
           </a:p>
@@ -2389,7 +2389,7 @@
           <a:p>
             <a:fld id="{EF03B490-B0C4-4A44-B4B5-AF20CBE90840}" type="datetimeFigureOut">
               <a:rPr lang="en-US" smtClean="0"/>
-              <a:t>6/13/2020</a:t>
+              <a:t>6/24/2020</a:t>
             </a:fld>
             <a:endParaRPr lang="en-US"/>
           </a:p>
@@ -2677,7 +2677,7 @@
           <a:p>
             <a:fld id="{EF03B490-B0C4-4A44-B4B5-AF20CBE90840}" type="datetimeFigureOut">
               <a:rPr lang="en-US" smtClean="0"/>
-              <a:t>6/13/2020</a:t>
+              <a:t>6/24/2020</a:t>
             </a:fld>
             <a:endParaRPr lang="en-US"/>
           </a:p>
@@ -2918,7 +2918,7 @@
           <a:p>
             <a:fld id="{EF03B490-B0C4-4A44-B4B5-AF20CBE90840}" type="datetimeFigureOut">
               <a:rPr lang="en-US" smtClean="0"/>
-              <a:t>6/13/2020</a:t>
+              <a:t>6/24/2020</a:t>
             </a:fld>
             <a:endParaRPr lang="en-US"/>
           </a:p>
@@ -4244,7 +4244,7 @@
         </p:blipFill>
         <p:spPr>
           <a:xfrm>
-            <a:off x="6375056" y="1294604"/>
+            <a:off x="6355737" y="1275286"/>
             <a:ext cx="5731510" cy="1574165"/>
           </a:xfrm>
           <a:prstGeom prst="rect">

</xml_diff>